<commit_message>
just one more thing :)
</commit_message>
<xml_diff>
--- a/saturn/saturn-payment-credentials.pptx
+++ b/saturn/saturn-payment-credentials.pptx
@@ -3165,14 +3165,14 @@
           <p:nvPr>
             <p:extLst>
               <p:ext uri="{D42A27DB-BD31-4B8C-83A1-F6EECF244321}">
-                <p14:modId xmlns:p14="http://schemas.microsoft.com/office/powerpoint/2010/main" val="4175805907"/>
+                <p14:modId xmlns:p14="http://schemas.microsoft.com/office/powerpoint/2010/main" val="1192108955"/>
               </p:ext>
             </p:extLst>
           </p:nvPr>
         </p:nvGraphicFramePr>
         <p:xfrm>
           <a:off x="401398" y="698558"/>
-          <a:ext cx="8352928" cy="5887920"/>
+          <a:ext cx="8352928" cy="5714760"/>
         </p:xfrm>
         <a:graphic>
           <a:graphicData uri="http://schemas.openxmlformats.org/drawingml/2006/table">
@@ -3182,8 +3182,8 @@
               </a:tblPr>
               <a:tblGrid>
                 <a:gridCol w="1782243"/>
-                <a:gridCol w="3258317"/>
-                <a:gridCol w="3312368"/>
+                <a:gridCol w="3396471"/>
+                <a:gridCol w="3174214"/>
               </a:tblGrid>
               <a:tr h="262828">
                 <a:tc>
@@ -3317,7 +3317,15 @@
                       </a:r>
                       <a:r>
                         <a:rPr lang="en-US" sz="1200" baseline="0" dirty="0" smtClean="0"/>
-                        <a:t> associated with the credential.</a:t>
+                        <a:t> associated with the </a:t>
+                      </a:r>
+                      <a:r>
+                        <a:rPr lang="en-US" sz="1200" baseline="0" dirty="0" smtClean="0"/>
+                        <a:t>payment credential</a:t>
+                      </a:r>
+                      <a:r>
+                        <a:rPr lang="en-US" sz="1200" baseline="0" dirty="0" smtClean="0"/>
+                        <a:t>.</a:t>
                       </a:r>
                       <a:endParaRPr lang="en-US" sz="1200" dirty="0"/>
                     </a:p>
@@ -3387,11 +3395,7 @@
                       </a:r>
                       <a:r>
                         <a:rPr lang="en-US" sz="1200" i="1" baseline="0" dirty="0" smtClean="0"/>
-                        <a:t>This data also </a:t>
-                      </a:r>
-                      <a:r>
-                        <a:rPr lang="en-US" sz="1200" i="1" baseline="0" dirty="0" smtClean="0"/>
-                        <a:t>plays a crucial role for establishing scalable trust between entities</a:t>
+                        <a:t>This data also plays a crucial role for establishing scalable trust between entities</a:t>
                       </a:r>
                       <a:r>
                         <a:rPr lang="en-US" sz="1200" baseline="0" dirty="0" smtClean="0"/>
@@ -3515,23 +3519,7 @@
                       </a:r>
                       <a:r>
                         <a:rPr lang="en-US" sz="1200" baseline="0" dirty="0" smtClean="0"/>
-                        <a:t>), telling the </a:t>
-                      </a:r>
-                      <a:r>
-                        <a:rPr lang="en-US" sz="1200" baseline="0" dirty="0" smtClean="0"/>
-                        <a:t>local client application </a:t>
-                      </a:r>
-                      <a:r>
-                        <a:rPr lang="en-US" sz="1200" baseline="0" dirty="0" smtClean="0"/>
-                        <a:t>how to encrypt user authorization data (an alternative </a:t>
-                      </a:r>
-                      <a:r>
-                        <a:rPr lang="en-US" sz="1200" baseline="0" dirty="0" smtClean="0"/>
-                        <a:t>to “tokenization</a:t>
-                      </a:r>
-                      <a:r>
-                        <a:rPr lang="en-US" sz="1200" baseline="0" dirty="0" smtClean="0"/>
-                        <a:t>”).</a:t>
+                        <a:t>), telling the local client application how to encrypt user authorization data (an alternative to “tokenization”).</a:t>
                       </a:r>
                       <a:endParaRPr lang="en-US" sz="1200" dirty="0"/>
                     </a:p>
@@ -3620,7 +3608,7 @@
                         <a:t> key (including public key) used for authorizing payment requests associated with </a:t>
                       </a:r>
                       <a:r>
-                        <a:rPr lang="en-US" sz="1200" baseline="0" dirty="0" err="1" smtClean="0"/>
+                        <a:rPr lang="en-US" sz="1200" b="1" baseline="0" dirty="0" err="1" smtClean="0"/>
                         <a:t>accountId</a:t>
                       </a:r>
                       <a:r>
@@ -3693,7 +3681,7 @@
                         <a:t>Private key (including public key) used for authorizing balance requests associated with </a:t>
                       </a:r>
                       <a:r>
-                        <a:rPr lang="en-US" sz="1200" dirty="0" err="1" smtClean="0"/>
+                        <a:rPr lang="en-US" sz="1200" b="1" dirty="0" err="1" smtClean="0"/>
                         <a:t>accountId</a:t>
                       </a:r>
                       <a:r>
@@ -3706,7 +3694,11 @@
                       </a:r>
                       <a:r>
                         <a:rPr lang="en-US" sz="1200" i="1" baseline="0" dirty="0" smtClean="0"/>
-                        <a:t> is used in the background and does not require user interaction since it only reads data and only for a specific account</a:t>
+                        <a:t> is used in the background and does not require user interaction since </a:t>
+                      </a:r>
+                      <a:r>
+                        <a:rPr lang="en-US" sz="1200" i="1" baseline="0" dirty="0" smtClean="0"/>
+                        <a:t>balance access is read only and limited to a specific account</a:t>
                       </a:r>
                       <a:r>
                         <a:rPr lang="en-US" sz="1200" baseline="0" dirty="0" smtClean="0"/>
@@ -3771,7 +3763,15 @@
                       </a:r>
                       <a:r>
                         <a:rPr lang="en-US" sz="1200" baseline="0" dirty="0" smtClean="0"/>
-                        <a:t> representation of the credential.</a:t>
+                        <a:t> representation of the </a:t>
+                      </a:r>
+                      <a:r>
+                        <a:rPr lang="en-US" sz="1200" baseline="0" dirty="0" smtClean="0"/>
+                        <a:t>payment credential</a:t>
+                      </a:r>
+                      <a:r>
+                        <a:rPr lang="en-US" sz="1200" baseline="0" dirty="0" smtClean="0"/>
+                        <a:t>.</a:t>
                       </a:r>
                       <a:endParaRPr lang="en-US" sz="1200" dirty="0"/>
                     </a:p>
@@ -3827,7 +3827,7 @@
         </p:blipFill>
         <p:spPr>
           <a:xfrm>
-            <a:off x="5441958" y="5604071"/>
+            <a:off x="5581776" y="5421776"/>
             <a:ext cx="1584176" cy="993281"/>
           </a:xfrm>
           <a:prstGeom prst="rect">

</xml_diff>